<commit_message>
Implelment parsing for BooleanTimeDuration condition
</commit_message>
<xml_diff>
--- a/EnviroControl/Resources/icons/designer.pptx
+++ b/EnviroControl/Resources/icons/designer.pptx
@@ -106,6 +106,11 @@
       </a:defRPr>
     </a:lvl9pPr>
   </p:defaultTextStyle>
+  <p:extLst>
+    <p:ext uri="{EFAFB233-063F-42B5-8137-9DF3F51BA10A}">
+      <p15:sldGuideLst xmlns:p15="http://schemas.microsoft.com/office/powerpoint/2012/main"/>
+    </p:ext>
+  </p:extLst>
 </p:presentation>
 </file>
 
@@ -256,7 +261,7 @@
           <a:p>
             <a:fld id="{04D353CA-F39B-41B1-8016-75D78154E5B6}" type="datetimeFigureOut">
               <a:rPr lang="de-DE" smtClean="0"/>
-              <a:t>12.07.2025</a:t>
+              <a:t>27.07.2025</a:t>
             </a:fld>
             <a:endParaRPr lang="de-DE"/>
           </a:p>
@@ -454,7 +459,7 @@
           <a:p>
             <a:fld id="{04D353CA-F39B-41B1-8016-75D78154E5B6}" type="datetimeFigureOut">
               <a:rPr lang="de-DE" smtClean="0"/>
-              <a:t>12.07.2025</a:t>
+              <a:t>27.07.2025</a:t>
             </a:fld>
             <a:endParaRPr lang="de-DE"/>
           </a:p>
@@ -662,7 +667,7 @@
           <a:p>
             <a:fld id="{04D353CA-F39B-41B1-8016-75D78154E5B6}" type="datetimeFigureOut">
               <a:rPr lang="de-DE" smtClean="0"/>
-              <a:t>12.07.2025</a:t>
+              <a:t>27.07.2025</a:t>
             </a:fld>
             <a:endParaRPr lang="de-DE"/>
           </a:p>
@@ -860,7 +865,7 @@
           <a:p>
             <a:fld id="{04D353CA-F39B-41B1-8016-75D78154E5B6}" type="datetimeFigureOut">
               <a:rPr lang="de-DE" smtClean="0"/>
-              <a:t>12.07.2025</a:t>
+              <a:t>27.07.2025</a:t>
             </a:fld>
             <a:endParaRPr lang="de-DE"/>
           </a:p>
@@ -1135,7 +1140,7 @@
           <a:p>
             <a:fld id="{04D353CA-F39B-41B1-8016-75D78154E5B6}" type="datetimeFigureOut">
               <a:rPr lang="de-DE" smtClean="0"/>
-              <a:t>12.07.2025</a:t>
+              <a:t>27.07.2025</a:t>
             </a:fld>
             <a:endParaRPr lang="de-DE"/>
           </a:p>
@@ -1400,7 +1405,7 @@
           <a:p>
             <a:fld id="{04D353CA-F39B-41B1-8016-75D78154E5B6}" type="datetimeFigureOut">
               <a:rPr lang="de-DE" smtClean="0"/>
-              <a:t>12.07.2025</a:t>
+              <a:t>27.07.2025</a:t>
             </a:fld>
             <a:endParaRPr lang="de-DE"/>
           </a:p>
@@ -1812,7 +1817,7 @@
           <a:p>
             <a:fld id="{04D353CA-F39B-41B1-8016-75D78154E5B6}" type="datetimeFigureOut">
               <a:rPr lang="de-DE" smtClean="0"/>
-              <a:t>12.07.2025</a:t>
+              <a:t>27.07.2025</a:t>
             </a:fld>
             <a:endParaRPr lang="de-DE"/>
           </a:p>
@@ -1953,7 +1958,7 @@
           <a:p>
             <a:fld id="{04D353CA-F39B-41B1-8016-75D78154E5B6}" type="datetimeFigureOut">
               <a:rPr lang="de-DE" smtClean="0"/>
-              <a:t>12.07.2025</a:t>
+              <a:t>27.07.2025</a:t>
             </a:fld>
             <a:endParaRPr lang="de-DE"/>
           </a:p>
@@ -2066,7 +2071,7 @@
           <a:p>
             <a:fld id="{04D353CA-F39B-41B1-8016-75D78154E5B6}" type="datetimeFigureOut">
               <a:rPr lang="de-DE" smtClean="0"/>
-              <a:t>12.07.2025</a:t>
+              <a:t>27.07.2025</a:t>
             </a:fld>
             <a:endParaRPr lang="de-DE"/>
           </a:p>
@@ -2377,7 +2382,7 @@
           <a:p>
             <a:fld id="{04D353CA-F39B-41B1-8016-75D78154E5B6}" type="datetimeFigureOut">
               <a:rPr lang="de-DE" smtClean="0"/>
-              <a:t>12.07.2025</a:t>
+              <a:t>27.07.2025</a:t>
             </a:fld>
             <a:endParaRPr lang="de-DE"/>
           </a:p>
@@ -2665,7 +2670,7 @@
           <a:p>
             <a:fld id="{04D353CA-F39B-41B1-8016-75D78154E5B6}" type="datetimeFigureOut">
               <a:rPr lang="de-DE" smtClean="0"/>
-              <a:t>12.07.2025</a:t>
+              <a:t>27.07.2025</a:t>
             </a:fld>
             <a:endParaRPr lang="de-DE"/>
           </a:p>
@@ -2906,7 +2911,7 @@
           <a:p>
             <a:fld id="{04D353CA-F39B-41B1-8016-75D78154E5B6}" type="datetimeFigureOut">
               <a:rPr lang="de-DE" smtClean="0"/>
-              <a:t>12.07.2025</a:t>
+              <a:t>27.07.2025</a:t>
             </a:fld>
             <a:endParaRPr lang="de-DE"/>
           </a:p>
@@ -3587,6 +3592,137 @@
                 </a:rPr>
                 <a:t>?</a:t>
               </a:r>
+            </a:p>
+          </p:txBody>
+        </p:sp>
+      </p:grpSp>
+      <p:grpSp>
+        <p:nvGrpSpPr>
+          <p:cNvPr id="11" name="Gruppieren 10">
+            <a:extLst>
+              <a:ext uri="{FF2B5EF4-FFF2-40B4-BE49-F238E27FC236}">
+                <a16:creationId xmlns:a16="http://schemas.microsoft.com/office/drawing/2014/main" id="{ADEDDDE5-0154-749E-D61F-8F896838D9F1}"/>
+              </a:ext>
+            </a:extLst>
+          </p:cNvPr>
+          <p:cNvGrpSpPr/>
+          <p:nvPr/>
+        </p:nvGrpSpPr>
+        <p:grpSpPr>
+          <a:xfrm>
+            <a:off x="3852577" y="4515972"/>
+            <a:ext cx="551334" cy="544607"/>
+            <a:chOff x="3852577" y="4515972"/>
+            <a:chExt cx="551334" cy="544607"/>
+          </a:xfrm>
+        </p:grpSpPr>
+        <p:sp>
+          <p:nvSpPr>
+            <p:cNvPr id="2" name="Pfeil: nach rechts gekrümmt 1">
+              <a:extLst>
+                <a:ext uri="{FF2B5EF4-FFF2-40B4-BE49-F238E27FC236}">
+                  <a16:creationId xmlns:a16="http://schemas.microsoft.com/office/drawing/2014/main" id="{E809D281-2A0B-B427-4CFC-8B8915629940}"/>
+                </a:ext>
+              </a:extLst>
+            </p:cNvPr>
+            <p:cNvSpPr/>
+            <p:nvPr/>
+          </p:nvSpPr>
+          <p:spPr>
+            <a:xfrm rot="10800000">
+              <a:off x="4168588" y="4515972"/>
+              <a:ext cx="235323" cy="531158"/>
+            </a:xfrm>
+            <a:prstGeom prst="curvedRightArrow">
+              <a:avLst/>
+            </a:prstGeom>
+            <a:ln w="57150">
+              <a:solidFill>
+                <a:srgbClr val="0070C0"/>
+              </a:solidFill>
+            </a:ln>
+          </p:spPr>
+          <p:style>
+            <a:lnRef idx="2">
+              <a:schemeClr val="accent1">
+                <a:shade val="15000"/>
+              </a:schemeClr>
+            </a:lnRef>
+            <a:fillRef idx="1">
+              <a:schemeClr val="accent1"/>
+            </a:fillRef>
+            <a:effectRef idx="0">
+              <a:schemeClr val="accent1"/>
+            </a:effectRef>
+            <a:fontRef idx="minor">
+              <a:schemeClr val="lt1"/>
+            </a:fontRef>
+          </p:style>
+          <p:txBody>
+            <a:bodyPr rtlCol="0" anchor="ctr"/>
+            <a:lstStyle/>
+            <a:p>
+              <a:pPr algn="ctr"/>
+              <a:endParaRPr lang="de-DE">
+                <a:solidFill>
+                  <a:schemeClr val="tx1"/>
+                </a:solidFill>
+              </a:endParaRPr>
+            </a:p>
+          </p:txBody>
+        </p:sp>
+        <p:sp>
+          <p:nvSpPr>
+            <p:cNvPr id="10" name="Pfeil: nach rechts gekrümmt 9">
+              <a:extLst>
+                <a:ext uri="{FF2B5EF4-FFF2-40B4-BE49-F238E27FC236}">
+                  <a16:creationId xmlns:a16="http://schemas.microsoft.com/office/drawing/2014/main" id="{23574F98-F4FB-411E-52AE-FFCFF64365F6}"/>
+                </a:ext>
+              </a:extLst>
+            </p:cNvPr>
+            <p:cNvSpPr/>
+            <p:nvPr/>
+          </p:nvSpPr>
+          <p:spPr>
+            <a:xfrm>
+              <a:off x="3852577" y="4529421"/>
+              <a:ext cx="235323" cy="531158"/>
+            </a:xfrm>
+            <a:prstGeom prst="curvedRightArrow">
+              <a:avLst/>
+            </a:prstGeom>
+            <a:ln w="57150">
+              <a:solidFill>
+                <a:srgbClr val="0070C0"/>
+              </a:solidFill>
+            </a:ln>
+          </p:spPr>
+          <p:style>
+            <a:lnRef idx="2">
+              <a:schemeClr val="accent1">
+                <a:shade val="15000"/>
+              </a:schemeClr>
+            </a:lnRef>
+            <a:fillRef idx="1">
+              <a:schemeClr val="accent1"/>
+            </a:fillRef>
+            <a:effectRef idx="0">
+              <a:schemeClr val="accent1"/>
+            </a:effectRef>
+            <a:fontRef idx="minor">
+              <a:schemeClr val="lt1"/>
+            </a:fontRef>
+          </p:style>
+          <p:txBody>
+            <a:bodyPr rtlCol="0" anchor="ctr"/>
+            <a:lstStyle/>
+            <a:p>
+              <a:pPr algn="ctr"/>
+              <a:endParaRPr lang="de-DE">
+                <a:solidFill>
+                  <a:schemeClr val="tx1"/>
+                </a:solidFill>
+              </a:endParaRPr>
             </a:p>
           </p:txBody>
         </p:sp>

</xml_diff>

<commit_message>
Adjust ui file, prepare for IndoorStationWidget
</commit_message>
<xml_diff>
--- a/EnviroControl/Resources/icons/designer.pptx
+++ b/EnviroControl/Resources/icons/designer.pptx
@@ -5273,513 +5273,534 @@
           <a:chExt cx="0" cy="0"/>
         </a:xfrm>
       </p:grpSpPr>
-      <p:sp>
-        <p:nvSpPr>
-          <p:cNvPr id="12" name="Bogen 11">
-            <a:extLst>
-              <a:ext uri="{FF2B5EF4-FFF2-40B4-BE49-F238E27FC236}">
-                <a16:creationId xmlns:a16="http://schemas.microsoft.com/office/drawing/2014/main" id="{38CE13D6-7AEC-0F0A-007E-6FEF9A485E29}"/>
-              </a:ext>
-            </a:extLst>
-          </p:cNvPr>
-          <p:cNvSpPr>
-            <a:spLocks noChangeAspect="1"/>
-          </p:cNvSpPr>
+      <p:grpSp>
+        <p:nvGrpSpPr>
+          <p:cNvPr id="46" name="Gruppieren 45">
+            <a:extLst>
+              <a:ext uri="{FF2B5EF4-FFF2-40B4-BE49-F238E27FC236}">
+                <a16:creationId xmlns:a16="http://schemas.microsoft.com/office/drawing/2014/main" id="{8CDF1625-48C1-6650-D9FB-153FF271F0F2}"/>
+              </a:ext>
+            </a:extLst>
+          </p:cNvPr>
+          <p:cNvGrpSpPr/>
           <p:nvPr/>
-        </p:nvSpPr>
-        <p:spPr>
+        </p:nvGrpSpPr>
+        <p:grpSpPr>
           <a:xfrm>
-            <a:off x="2223805" y="4290834"/>
-            <a:ext cx="1360273" cy="1360273"/>
+            <a:off x="2109939" y="737345"/>
+            <a:ext cx="1487587" cy="4920486"/>
+            <a:chOff x="2109939" y="737345"/>
+            <a:chExt cx="1487587" cy="4920486"/>
           </a:xfrm>
-          <a:prstGeom prst="arc">
-            <a:avLst>
-              <a:gd name="adj1" fmla="val 18125676"/>
-              <a:gd name="adj2" fmla="val 14042561"/>
-            </a:avLst>
-          </a:prstGeom>
-          <a:ln w="127000">
-            <a:solidFill>
+        </p:grpSpPr>
+        <p:sp>
+          <p:nvSpPr>
+            <p:cNvPr id="12" name="Bogen 11">
+              <a:extLst>
+                <a:ext uri="{FF2B5EF4-FFF2-40B4-BE49-F238E27FC236}">
+                  <a16:creationId xmlns:a16="http://schemas.microsoft.com/office/drawing/2014/main" id="{38CE13D6-7AEC-0F0A-007E-6FEF9A485E29}"/>
+                </a:ext>
+              </a:extLst>
+            </p:cNvPr>
+            <p:cNvSpPr>
+              <a:spLocks noChangeAspect="1"/>
+            </p:cNvSpPr>
+            <p:nvPr/>
+          </p:nvSpPr>
+          <p:spPr>
+            <a:xfrm>
+              <a:off x="2237253" y="4297558"/>
+              <a:ext cx="1360273" cy="1360273"/>
+            </a:xfrm>
+            <a:prstGeom prst="arc">
+              <a:avLst>
+                <a:gd name="adj1" fmla="val 18125676"/>
+                <a:gd name="adj2" fmla="val 14042561"/>
+              </a:avLst>
+            </a:prstGeom>
+            <a:ln w="127000">
+              <a:solidFill>
+                <a:schemeClr val="tx1"/>
+              </a:solidFill>
+            </a:ln>
+          </p:spPr>
+          <p:style>
+            <a:lnRef idx="2">
+              <a:schemeClr val="accent1"/>
+            </a:lnRef>
+            <a:fillRef idx="0">
+              <a:schemeClr val="accent1"/>
+            </a:fillRef>
+            <a:effectRef idx="1">
+              <a:schemeClr val="accent1"/>
+            </a:effectRef>
+            <a:fontRef idx="minor">
               <a:schemeClr val="tx1"/>
-            </a:solidFill>
-          </a:ln>
-        </p:spPr>
-        <p:style>
-          <a:lnRef idx="2">
-            <a:schemeClr val="accent1"/>
-          </a:lnRef>
-          <a:fillRef idx="0">
-            <a:schemeClr val="accent1"/>
-          </a:fillRef>
-          <a:effectRef idx="1">
-            <a:schemeClr val="accent1"/>
-          </a:effectRef>
-          <a:fontRef idx="minor">
-            <a:schemeClr val="tx1"/>
-          </a:fontRef>
-        </p:style>
-        <p:txBody>
-          <a:bodyPr rtlCol="0" anchor="ctr"/>
-          <a:lstStyle/>
-          <a:p>
-            <a:pPr algn="ctr"/>
-            <a:endParaRPr lang="de-DE"/>
-          </a:p>
-        </p:txBody>
-      </p:sp>
-      <p:cxnSp>
-        <p:nvCxnSpPr>
-          <p:cNvPr id="21" name="Gerader Verbinder 20">
-            <a:extLst>
-              <a:ext uri="{FF2B5EF4-FFF2-40B4-BE49-F238E27FC236}">
-                <a16:creationId xmlns:a16="http://schemas.microsoft.com/office/drawing/2014/main" id="{DBB66054-0065-D172-0069-33293221748F}"/>
-              </a:ext>
-            </a:extLst>
-          </p:cNvPr>
-          <p:cNvCxnSpPr>
-            <a:cxnSpLocks/>
-            <a:stCxn id="24" idx="0"/>
-          </p:cNvCxnSpPr>
-          <p:nvPr/>
-        </p:nvCxnSpPr>
-        <p:spPr>
-          <a:xfrm>
-            <a:off x="2487770" y="971571"/>
-            <a:ext cx="0" cy="3486129"/>
-          </a:xfrm>
-          <a:prstGeom prst="line">
-            <a:avLst/>
-          </a:prstGeom>
-          <a:ln w="127000">
-            <a:solidFill>
+            </a:fontRef>
+          </p:style>
+          <p:txBody>
+            <a:bodyPr rtlCol="0" anchor="ctr"/>
+            <a:lstStyle/>
+            <a:p>
+              <a:pPr algn="ctr"/>
+              <a:endParaRPr lang="de-DE"/>
+            </a:p>
+          </p:txBody>
+        </p:sp>
+        <p:cxnSp>
+          <p:nvCxnSpPr>
+            <p:cNvPr id="21" name="Gerader Verbinder 20">
+              <a:extLst>
+                <a:ext uri="{FF2B5EF4-FFF2-40B4-BE49-F238E27FC236}">
+                  <a16:creationId xmlns:a16="http://schemas.microsoft.com/office/drawing/2014/main" id="{DBB66054-0065-D172-0069-33293221748F}"/>
+                </a:ext>
+              </a:extLst>
+            </p:cNvPr>
+            <p:cNvCxnSpPr>
+              <a:cxnSpLocks/>
+              <a:stCxn id="24" idx="0"/>
+            </p:cNvCxnSpPr>
+            <p:nvPr/>
+          </p:nvCxnSpPr>
+          <p:spPr>
+            <a:xfrm>
+              <a:off x="2487770" y="971571"/>
+              <a:ext cx="0" cy="3486129"/>
+            </a:xfrm>
+            <a:prstGeom prst="line">
+              <a:avLst/>
+            </a:prstGeom>
+            <a:ln w="127000">
+              <a:solidFill>
+                <a:schemeClr val="tx1"/>
+              </a:solidFill>
+            </a:ln>
+          </p:spPr>
+          <p:style>
+            <a:lnRef idx="2">
+              <a:schemeClr val="accent1"/>
+            </a:lnRef>
+            <a:fillRef idx="0">
+              <a:schemeClr val="accent1"/>
+            </a:fillRef>
+            <a:effectRef idx="1">
+              <a:schemeClr val="accent1"/>
+            </a:effectRef>
+            <a:fontRef idx="minor">
               <a:schemeClr val="tx1"/>
-            </a:solidFill>
-          </a:ln>
-        </p:spPr>
-        <p:style>
-          <a:lnRef idx="2">
-            <a:schemeClr val="accent1"/>
-          </a:lnRef>
-          <a:fillRef idx="0">
-            <a:schemeClr val="accent1"/>
-          </a:fillRef>
-          <a:effectRef idx="1">
-            <a:schemeClr val="accent1"/>
-          </a:effectRef>
-          <a:fontRef idx="minor">
-            <a:schemeClr val="tx1"/>
-          </a:fontRef>
-        </p:style>
-      </p:cxnSp>
-      <p:sp>
-        <p:nvSpPr>
-          <p:cNvPr id="24" name="Bogen 23">
-            <a:extLst>
-              <a:ext uri="{FF2B5EF4-FFF2-40B4-BE49-F238E27FC236}">
-                <a16:creationId xmlns:a16="http://schemas.microsoft.com/office/drawing/2014/main" id="{58781BB6-2D36-8974-8A14-9620F5B0C56F}"/>
-              </a:ext>
-            </a:extLst>
-          </p:cNvPr>
-          <p:cNvSpPr>
-            <a:spLocks noChangeAspect="1"/>
-          </p:cNvSpPr>
-          <p:nvPr/>
-        </p:nvSpPr>
-        <p:spPr>
-          <a:xfrm>
-            <a:off x="2487705" y="737345"/>
-            <a:ext cx="479611" cy="479611"/>
-          </a:xfrm>
-          <a:prstGeom prst="arc">
-            <a:avLst>
-              <a:gd name="adj1" fmla="val 10879999"/>
-              <a:gd name="adj2" fmla="val 16214288"/>
-            </a:avLst>
-          </a:prstGeom>
-          <a:ln w="127000">
-            <a:solidFill>
+            </a:fontRef>
+          </p:style>
+        </p:cxnSp>
+        <p:sp>
+          <p:nvSpPr>
+            <p:cNvPr id="24" name="Bogen 23">
+              <a:extLst>
+                <a:ext uri="{FF2B5EF4-FFF2-40B4-BE49-F238E27FC236}">
+                  <a16:creationId xmlns:a16="http://schemas.microsoft.com/office/drawing/2014/main" id="{58781BB6-2D36-8974-8A14-9620F5B0C56F}"/>
+                </a:ext>
+              </a:extLst>
+            </p:cNvPr>
+            <p:cNvSpPr>
+              <a:spLocks noChangeAspect="1"/>
+            </p:cNvSpPr>
+            <p:nvPr/>
+          </p:nvSpPr>
+          <p:spPr>
+            <a:xfrm>
+              <a:off x="2487705" y="737345"/>
+              <a:ext cx="479611" cy="479611"/>
+            </a:xfrm>
+            <a:prstGeom prst="arc">
+              <a:avLst>
+                <a:gd name="adj1" fmla="val 10879999"/>
+                <a:gd name="adj2" fmla="val 16214288"/>
+              </a:avLst>
+            </a:prstGeom>
+            <a:ln w="127000">
+              <a:solidFill>
+                <a:schemeClr val="tx1"/>
+              </a:solidFill>
+            </a:ln>
+          </p:spPr>
+          <p:style>
+            <a:lnRef idx="2">
+              <a:schemeClr val="accent1"/>
+            </a:lnRef>
+            <a:fillRef idx="0">
+              <a:schemeClr val="accent1"/>
+            </a:fillRef>
+            <a:effectRef idx="1">
+              <a:schemeClr val="accent1"/>
+            </a:effectRef>
+            <a:fontRef idx="minor">
               <a:schemeClr val="tx1"/>
-            </a:solidFill>
-          </a:ln>
-        </p:spPr>
-        <p:style>
-          <a:lnRef idx="2">
-            <a:schemeClr val="accent1"/>
-          </a:lnRef>
-          <a:fillRef idx="0">
-            <a:schemeClr val="accent1"/>
-          </a:fillRef>
-          <a:effectRef idx="1">
-            <a:schemeClr val="accent1"/>
-          </a:effectRef>
-          <a:fontRef idx="minor">
-            <a:schemeClr val="tx1"/>
-          </a:fontRef>
-        </p:style>
-        <p:txBody>
-          <a:bodyPr rtlCol="0" anchor="ctr"/>
-          <a:lstStyle/>
-          <a:p>
-            <a:pPr algn="ctr"/>
-            <a:endParaRPr lang="de-DE"/>
-          </a:p>
-        </p:txBody>
-      </p:sp>
-      <p:cxnSp>
-        <p:nvCxnSpPr>
-          <p:cNvPr id="26" name="Gerader Verbinder 25">
-            <a:extLst>
-              <a:ext uri="{FF2B5EF4-FFF2-40B4-BE49-F238E27FC236}">
-                <a16:creationId xmlns:a16="http://schemas.microsoft.com/office/drawing/2014/main" id="{F4FD15D2-97C7-54EE-2D43-8CCF7EC54047}"/>
-              </a:ext>
-            </a:extLst>
-          </p:cNvPr>
-          <p:cNvCxnSpPr>
-            <a:cxnSpLocks/>
-          </p:cNvCxnSpPr>
-          <p:nvPr/>
-        </p:nvCxnSpPr>
-        <p:spPr>
-          <a:xfrm flipV="1">
-            <a:off x="2721783" y="737345"/>
-            <a:ext cx="337422" cy="2"/>
-          </a:xfrm>
-          <a:prstGeom prst="line">
-            <a:avLst/>
-          </a:prstGeom>
-          <a:ln w="127000">
-            <a:solidFill>
+            </a:fontRef>
+          </p:style>
+          <p:txBody>
+            <a:bodyPr rtlCol="0" anchor="ctr"/>
+            <a:lstStyle/>
+            <a:p>
+              <a:pPr algn="ctr"/>
+              <a:endParaRPr lang="de-DE"/>
+            </a:p>
+          </p:txBody>
+        </p:sp>
+        <p:cxnSp>
+          <p:nvCxnSpPr>
+            <p:cNvPr id="26" name="Gerader Verbinder 25">
+              <a:extLst>
+                <a:ext uri="{FF2B5EF4-FFF2-40B4-BE49-F238E27FC236}">
+                  <a16:creationId xmlns:a16="http://schemas.microsoft.com/office/drawing/2014/main" id="{F4FD15D2-97C7-54EE-2D43-8CCF7EC54047}"/>
+                </a:ext>
+              </a:extLst>
+            </p:cNvPr>
+            <p:cNvCxnSpPr>
+              <a:cxnSpLocks/>
+            </p:cNvCxnSpPr>
+            <p:nvPr/>
+          </p:nvCxnSpPr>
+          <p:spPr>
+            <a:xfrm flipV="1">
+              <a:off x="2721783" y="737345"/>
+              <a:ext cx="337422" cy="2"/>
+            </a:xfrm>
+            <a:prstGeom prst="line">
+              <a:avLst/>
+            </a:prstGeom>
+            <a:ln w="127000">
+              <a:solidFill>
+                <a:schemeClr val="tx1"/>
+              </a:solidFill>
+            </a:ln>
+          </p:spPr>
+          <p:style>
+            <a:lnRef idx="2">
+              <a:schemeClr val="accent1"/>
+            </a:lnRef>
+            <a:fillRef idx="0">
+              <a:schemeClr val="accent1"/>
+            </a:fillRef>
+            <a:effectRef idx="1">
+              <a:schemeClr val="accent1"/>
+            </a:effectRef>
+            <a:fontRef idx="minor">
               <a:schemeClr val="tx1"/>
-            </a:solidFill>
-          </a:ln>
-        </p:spPr>
-        <p:style>
-          <a:lnRef idx="2">
-            <a:schemeClr val="accent1"/>
-          </a:lnRef>
-          <a:fillRef idx="0">
-            <a:schemeClr val="accent1"/>
-          </a:fillRef>
-          <a:effectRef idx="1">
-            <a:schemeClr val="accent1"/>
-          </a:effectRef>
-          <a:fontRef idx="minor">
-            <a:schemeClr val="tx1"/>
-          </a:fontRef>
-        </p:style>
-      </p:cxnSp>
-      <p:sp>
-        <p:nvSpPr>
-          <p:cNvPr id="31" name="Bogen 30">
-            <a:extLst>
-              <a:ext uri="{FF2B5EF4-FFF2-40B4-BE49-F238E27FC236}">
-                <a16:creationId xmlns:a16="http://schemas.microsoft.com/office/drawing/2014/main" id="{154DF50F-7426-E1C9-06A8-26E83AD6DF19}"/>
-              </a:ext>
-            </a:extLst>
-          </p:cNvPr>
-          <p:cNvSpPr>
-            <a:spLocks noChangeAspect="1"/>
-          </p:cNvSpPr>
-          <p:nvPr/>
-        </p:nvSpPr>
-        <p:spPr>
-          <a:xfrm flipH="1">
-            <a:off x="2819399" y="737345"/>
-            <a:ext cx="479611" cy="479611"/>
-          </a:xfrm>
-          <a:prstGeom prst="arc">
-            <a:avLst>
-              <a:gd name="adj1" fmla="val 10879999"/>
-              <a:gd name="adj2" fmla="val 16214288"/>
-            </a:avLst>
-          </a:prstGeom>
-          <a:ln w="127000">
-            <a:solidFill>
+            </a:fontRef>
+          </p:style>
+        </p:cxnSp>
+        <p:sp>
+          <p:nvSpPr>
+            <p:cNvPr id="31" name="Bogen 30">
+              <a:extLst>
+                <a:ext uri="{FF2B5EF4-FFF2-40B4-BE49-F238E27FC236}">
+                  <a16:creationId xmlns:a16="http://schemas.microsoft.com/office/drawing/2014/main" id="{154DF50F-7426-E1C9-06A8-26E83AD6DF19}"/>
+                </a:ext>
+              </a:extLst>
+            </p:cNvPr>
+            <p:cNvSpPr>
+              <a:spLocks noChangeAspect="1"/>
+            </p:cNvSpPr>
+            <p:nvPr/>
+          </p:nvSpPr>
+          <p:spPr>
+            <a:xfrm flipH="1">
+              <a:off x="2819399" y="737345"/>
+              <a:ext cx="479611" cy="479611"/>
+            </a:xfrm>
+            <a:prstGeom prst="arc">
+              <a:avLst>
+                <a:gd name="adj1" fmla="val 10879999"/>
+                <a:gd name="adj2" fmla="val 16214288"/>
+              </a:avLst>
+            </a:prstGeom>
+            <a:ln w="127000">
+              <a:solidFill>
+                <a:schemeClr val="tx1"/>
+              </a:solidFill>
+            </a:ln>
+          </p:spPr>
+          <p:style>
+            <a:lnRef idx="2">
+              <a:schemeClr val="accent1"/>
+            </a:lnRef>
+            <a:fillRef idx="0">
+              <a:schemeClr val="accent1"/>
+            </a:fillRef>
+            <a:effectRef idx="1">
+              <a:schemeClr val="accent1"/>
+            </a:effectRef>
+            <a:fontRef idx="minor">
               <a:schemeClr val="tx1"/>
-            </a:solidFill>
-          </a:ln>
-        </p:spPr>
-        <p:style>
-          <a:lnRef idx="2">
-            <a:schemeClr val="accent1"/>
-          </a:lnRef>
-          <a:fillRef idx="0">
-            <a:schemeClr val="accent1"/>
-          </a:fillRef>
-          <a:effectRef idx="1">
-            <a:schemeClr val="accent1"/>
-          </a:effectRef>
-          <a:fontRef idx="minor">
-            <a:schemeClr val="tx1"/>
-          </a:fontRef>
-        </p:style>
-        <p:txBody>
-          <a:bodyPr rtlCol="0" anchor="ctr"/>
-          <a:lstStyle/>
-          <a:p>
-            <a:pPr algn="ctr"/>
-            <a:endParaRPr lang="de-DE"/>
-          </a:p>
-        </p:txBody>
-      </p:sp>
-      <p:cxnSp>
-        <p:nvCxnSpPr>
-          <p:cNvPr id="32" name="Gerader Verbinder 31">
-            <a:extLst>
-              <a:ext uri="{FF2B5EF4-FFF2-40B4-BE49-F238E27FC236}">
-                <a16:creationId xmlns:a16="http://schemas.microsoft.com/office/drawing/2014/main" id="{F71BC069-2F31-2B51-86B2-52D260D11050}"/>
-              </a:ext>
-            </a:extLst>
-          </p:cNvPr>
-          <p:cNvCxnSpPr>
-            <a:cxnSpLocks/>
-          </p:cNvCxnSpPr>
-          <p:nvPr/>
-        </p:nvCxnSpPr>
-        <p:spPr>
-          <a:xfrm>
-            <a:off x="3298945" y="964847"/>
-            <a:ext cx="0" cy="3492853"/>
-          </a:xfrm>
-          <a:prstGeom prst="line">
-            <a:avLst/>
-          </a:prstGeom>
-          <a:ln w="127000">
-            <a:solidFill>
+            </a:fontRef>
+          </p:style>
+          <p:txBody>
+            <a:bodyPr rtlCol="0" anchor="ctr"/>
+            <a:lstStyle/>
+            <a:p>
+              <a:pPr algn="ctr"/>
+              <a:endParaRPr lang="de-DE"/>
+            </a:p>
+          </p:txBody>
+        </p:sp>
+        <p:cxnSp>
+          <p:nvCxnSpPr>
+            <p:cNvPr id="32" name="Gerader Verbinder 31">
+              <a:extLst>
+                <a:ext uri="{FF2B5EF4-FFF2-40B4-BE49-F238E27FC236}">
+                  <a16:creationId xmlns:a16="http://schemas.microsoft.com/office/drawing/2014/main" id="{F71BC069-2F31-2B51-86B2-52D260D11050}"/>
+                </a:ext>
+              </a:extLst>
+            </p:cNvPr>
+            <p:cNvCxnSpPr>
+              <a:cxnSpLocks/>
+            </p:cNvCxnSpPr>
+            <p:nvPr/>
+          </p:nvCxnSpPr>
+          <p:spPr>
+            <a:xfrm>
+              <a:off x="3298945" y="964847"/>
+              <a:ext cx="0" cy="3492853"/>
+            </a:xfrm>
+            <a:prstGeom prst="line">
+              <a:avLst/>
+            </a:prstGeom>
+            <a:ln w="127000">
+              <a:solidFill>
+                <a:schemeClr val="tx1"/>
+              </a:solidFill>
+            </a:ln>
+          </p:spPr>
+          <p:style>
+            <a:lnRef idx="2">
+              <a:schemeClr val="accent1"/>
+            </a:lnRef>
+            <a:fillRef idx="0">
+              <a:schemeClr val="accent1"/>
+            </a:fillRef>
+            <a:effectRef idx="1">
+              <a:schemeClr val="accent1"/>
+            </a:effectRef>
+            <a:fontRef idx="minor">
               <a:schemeClr val="tx1"/>
-            </a:solidFill>
-          </a:ln>
-        </p:spPr>
-        <p:style>
-          <a:lnRef idx="2">
-            <a:schemeClr val="accent1"/>
-          </a:lnRef>
-          <a:fillRef idx="0">
-            <a:schemeClr val="accent1"/>
-          </a:fillRef>
-          <a:effectRef idx="1">
-            <a:schemeClr val="accent1"/>
-          </a:effectRef>
-          <a:fontRef idx="minor">
-            <a:schemeClr val="tx1"/>
-          </a:fontRef>
-        </p:style>
-      </p:cxnSp>
-      <p:cxnSp>
-        <p:nvCxnSpPr>
-          <p:cNvPr id="41" name="Gerader Verbinder 40">
-            <a:extLst>
-              <a:ext uri="{FF2B5EF4-FFF2-40B4-BE49-F238E27FC236}">
-                <a16:creationId xmlns:a16="http://schemas.microsoft.com/office/drawing/2014/main" id="{07390AE4-9E69-4A8A-66E4-BE03BA8FA2F5}"/>
-              </a:ext>
-            </a:extLst>
-          </p:cNvPr>
-          <p:cNvCxnSpPr>
-            <a:cxnSpLocks/>
-          </p:cNvCxnSpPr>
-          <p:nvPr/>
-        </p:nvCxnSpPr>
-        <p:spPr>
-          <a:xfrm flipV="1">
-            <a:off x="2109939" y="4224616"/>
-            <a:ext cx="337422" cy="2"/>
-          </a:xfrm>
-          <a:prstGeom prst="line">
-            <a:avLst/>
-          </a:prstGeom>
-          <a:ln w="101600">
-            <a:solidFill>
+            </a:fontRef>
+          </p:style>
+        </p:cxnSp>
+        <p:cxnSp>
+          <p:nvCxnSpPr>
+            <p:cNvPr id="41" name="Gerader Verbinder 40">
+              <a:extLst>
+                <a:ext uri="{FF2B5EF4-FFF2-40B4-BE49-F238E27FC236}">
+                  <a16:creationId xmlns:a16="http://schemas.microsoft.com/office/drawing/2014/main" id="{07390AE4-9E69-4A8A-66E4-BE03BA8FA2F5}"/>
+                </a:ext>
+              </a:extLst>
+            </p:cNvPr>
+            <p:cNvCxnSpPr>
+              <a:cxnSpLocks/>
+            </p:cNvCxnSpPr>
+            <p:nvPr/>
+          </p:nvCxnSpPr>
+          <p:spPr>
+            <a:xfrm flipV="1">
+              <a:off x="2109939" y="4224616"/>
+              <a:ext cx="337422" cy="2"/>
+            </a:xfrm>
+            <a:prstGeom prst="line">
+              <a:avLst/>
+            </a:prstGeom>
+            <a:ln w="101600">
+              <a:solidFill>
+                <a:schemeClr val="tx1"/>
+              </a:solidFill>
+            </a:ln>
+          </p:spPr>
+          <p:style>
+            <a:lnRef idx="2">
+              <a:schemeClr val="accent1"/>
+            </a:lnRef>
+            <a:fillRef idx="0">
+              <a:schemeClr val="accent1"/>
+            </a:fillRef>
+            <a:effectRef idx="1">
+              <a:schemeClr val="accent1"/>
+            </a:effectRef>
+            <a:fontRef idx="minor">
               <a:schemeClr val="tx1"/>
-            </a:solidFill>
-          </a:ln>
-        </p:spPr>
-        <p:style>
-          <a:lnRef idx="2">
-            <a:schemeClr val="accent1"/>
-          </a:lnRef>
-          <a:fillRef idx="0">
-            <a:schemeClr val="accent1"/>
-          </a:fillRef>
-          <a:effectRef idx="1">
-            <a:schemeClr val="accent1"/>
-          </a:effectRef>
-          <a:fontRef idx="minor">
-            <a:schemeClr val="tx1"/>
-          </a:fontRef>
-        </p:style>
-      </p:cxnSp>
-      <p:cxnSp>
-        <p:nvCxnSpPr>
-          <p:cNvPr id="42" name="Gerader Verbinder 41">
-            <a:extLst>
-              <a:ext uri="{FF2B5EF4-FFF2-40B4-BE49-F238E27FC236}">
-                <a16:creationId xmlns:a16="http://schemas.microsoft.com/office/drawing/2014/main" id="{054B2D0C-C096-6FD7-CEAE-BE77212F711A}"/>
-              </a:ext>
-            </a:extLst>
-          </p:cNvPr>
-          <p:cNvCxnSpPr>
-            <a:cxnSpLocks/>
-          </p:cNvCxnSpPr>
-          <p:nvPr/>
-        </p:nvCxnSpPr>
-        <p:spPr>
-          <a:xfrm flipV="1">
-            <a:off x="2150283" y="1032087"/>
-            <a:ext cx="337422" cy="2"/>
-          </a:xfrm>
-          <a:prstGeom prst="line">
-            <a:avLst/>
-          </a:prstGeom>
-          <a:ln w="101600">
-            <a:solidFill>
+            </a:fontRef>
+          </p:style>
+        </p:cxnSp>
+        <p:cxnSp>
+          <p:nvCxnSpPr>
+            <p:cNvPr id="42" name="Gerader Verbinder 41">
+              <a:extLst>
+                <a:ext uri="{FF2B5EF4-FFF2-40B4-BE49-F238E27FC236}">
+                  <a16:creationId xmlns:a16="http://schemas.microsoft.com/office/drawing/2014/main" id="{054B2D0C-C096-6FD7-CEAE-BE77212F711A}"/>
+                </a:ext>
+              </a:extLst>
+            </p:cNvPr>
+            <p:cNvCxnSpPr>
+              <a:cxnSpLocks/>
+            </p:cNvCxnSpPr>
+            <p:nvPr/>
+          </p:nvCxnSpPr>
+          <p:spPr>
+            <a:xfrm flipV="1">
+              <a:off x="2150283" y="1032087"/>
+              <a:ext cx="337422" cy="2"/>
+            </a:xfrm>
+            <a:prstGeom prst="line">
+              <a:avLst/>
+            </a:prstGeom>
+            <a:ln w="101600">
+              <a:solidFill>
+                <a:schemeClr val="tx1"/>
+              </a:solidFill>
+            </a:ln>
+          </p:spPr>
+          <p:style>
+            <a:lnRef idx="2">
+              <a:schemeClr val="accent1"/>
+            </a:lnRef>
+            <a:fillRef idx="0">
+              <a:schemeClr val="accent1"/>
+            </a:fillRef>
+            <a:effectRef idx="1">
+              <a:schemeClr val="accent1"/>
+            </a:effectRef>
+            <a:fontRef idx="minor">
               <a:schemeClr val="tx1"/>
-            </a:solidFill>
-          </a:ln>
-        </p:spPr>
-        <p:style>
-          <a:lnRef idx="2">
-            <a:schemeClr val="accent1"/>
-          </a:lnRef>
-          <a:fillRef idx="0">
-            <a:schemeClr val="accent1"/>
-          </a:fillRef>
-          <a:effectRef idx="1">
-            <a:schemeClr val="accent1"/>
-          </a:effectRef>
-          <a:fontRef idx="minor">
-            <a:schemeClr val="tx1"/>
-          </a:fontRef>
-        </p:style>
-      </p:cxnSp>
-      <p:cxnSp>
-        <p:nvCxnSpPr>
-          <p:cNvPr id="43" name="Gerader Verbinder 42">
-            <a:extLst>
-              <a:ext uri="{FF2B5EF4-FFF2-40B4-BE49-F238E27FC236}">
-                <a16:creationId xmlns:a16="http://schemas.microsoft.com/office/drawing/2014/main" id="{D0C6CF81-078B-7567-2ACC-2EF4C1D38BB7}"/>
-              </a:ext>
-            </a:extLst>
-          </p:cNvPr>
-          <p:cNvCxnSpPr>
-            <a:cxnSpLocks/>
-          </p:cNvCxnSpPr>
-          <p:nvPr/>
-        </p:nvCxnSpPr>
-        <p:spPr>
-          <a:xfrm flipV="1">
-            <a:off x="2110753" y="2627840"/>
-            <a:ext cx="337422" cy="2"/>
-          </a:xfrm>
-          <a:prstGeom prst="line">
-            <a:avLst/>
-          </a:prstGeom>
-          <a:ln w="101600">
-            <a:solidFill>
+            </a:fontRef>
+          </p:style>
+        </p:cxnSp>
+        <p:cxnSp>
+          <p:nvCxnSpPr>
+            <p:cNvPr id="43" name="Gerader Verbinder 42">
+              <a:extLst>
+                <a:ext uri="{FF2B5EF4-FFF2-40B4-BE49-F238E27FC236}">
+                  <a16:creationId xmlns:a16="http://schemas.microsoft.com/office/drawing/2014/main" id="{D0C6CF81-078B-7567-2ACC-2EF4C1D38BB7}"/>
+                </a:ext>
+              </a:extLst>
+            </p:cNvPr>
+            <p:cNvCxnSpPr>
+              <a:cxnSpLocks/>
+            </p:cNvCxnSpPr>
+            <p:nvPr/>
+          </p:nvCxnSpPr>
+          <p:spPr>
+            <a:xfrm flipV="1">
+              <a:off x="2110753" y="2627840"/>
+              <a:ext cx="337422" cy="2"/>
+            </a:xfrm>
+            <a:prstGeom prst="line">
+              <a:avLst/>
+            </a:prstGeom>
+            <a:ln w="101600">
+              <a:solidFill>
+                <a:schemeClr val="tx1"/>
+              </a:solidFill>
+            </a:ln>
+          </p:spPr>
+          <p:style>
+            <a:lnRef idx="2">
+              <a:schemeClr val="accent1"/>
+            </a:lnRef>
+            <a:fillRef idx="0">
+              <a:schemeClr val="accent1"/>
+            </a:fillRef>
+            <a:effectRef idx="1">
+              <a:schemeClr val="accent1"/>
+            </a:effectRef>
+            <a:fontRef idx="minor">
               <a:schemeClr val="tx1"/>
-            </a:solidFill>
-          </a:ln>
-        </p:spPr>
-        <p:style>
-          <a:lnRef idx="2">
-            <a:schemeClr val="accent1"/>
-          </a:lnRef>
-          <a:fillRef idx="0">
-            <a:schemeClr val="accent1"/>
-          </a:fillRef>
-          <a:effectRef idx="1">
-            <a:schemeClr val="accent1"/>
-          </a:effectRef>
-          <a:fontRef idx="minor">
-            <a:schemeClr val="tx1"/>
-          </a:fontRef>
-        </p:style>
-      </p:cxnSp>
-      <p:cxnSp>
-        <p:nvCxnSpPr>
-          <p:cNvPr id="44" name="Gerader Verbinder 43">
-            <a:extLst>
-              <a:ext uri="{FF2B5EF4-FFF2-40B4-BE49-F238E27FC236}">
-                <a16:creationId xmlns:a16="http://schemas.microsoft.com/office/drawing/2014/main" id="{0A5BB4E2-E44B-4999-4436-72183666673C}"/>
-              </a:ext>
-            </a:extLst>
-          </p:cNvPr>
-          <p:cNvCxnSpPr>
-            <a:cxnSpLocks/>
-          </p:cNvCxnSpPr>
-          <p:nvPr/>
-        </p:nvCxnSpPr>
-        <p:spPr>
-          <a:xfrm flipV="1">
-            <a:off x="2124204" y="3405543"/>
-            <a:ext cx="337422" cy="2"/>
-          </a:xfrm>
-          <a:prstGeom prst="line">
-            <a:avLst/>
-          </a:prstGeom>
-          <a:ln w="101600">
-            <a:solidFill>
+            </a:fontRef>
+          </p:style>
+        </p:cxnSp>
+        <p:cxnSp>
+          <p:nvCxnSpPr>
+            <p:cNvPr id="44" name="Gerader Verbinder 43">
+              <a:extLst>
+                <a:ext uri="{FF2B5EF4-FFF2-40B4-BE49-F238E27FC236}">
+                  <a16:creationId xmlns:a16="http://schemas.microsoft.com/office/drawing/2014/main" id="{0A5BB4E2-E44B-4999-4436-72183666673C}"/>
+                </a:ext>
+              </a:extLst>
+            </p:cNvPr>
+            <p:cNvCxnSpPr>
+              <a:cxnSpLocks/>
+            </p:cNvCxnSpPr>
+            <p:nvPr/>
+          </p:nvCxnSpPr>
+          <p:spPr>
+            <a:xfrm flipV="1">
+              <a:off x="2124204" y="3405543"/>
+              <a:ext cx="337422" cy="2"/>
+            </a:xfrm>
+            <a:prstGeom prst="line">
+              <a:avLst/>
+            </a:prstGeom>
+            <a:ln w="101600">
+              <a:solidFill>
+                <a:schemeClr val="tx1"/>
+              </a:solidFill>
+            </a:ln>
+          </p:spPr>
+          <p:style>
+            <a:lnRef idx="2">
+              <a:schemeClr val="accent1"/>
+            </a:lnRef>
+            <a:fillRef idx="0">
+              <a:schemeClr val="accent1"/>
+            </a:fillRef>
+            <a:effectRef idx="1">
+              <a:schemeClr val="accent1"/>
+            </a:effectRef>
+            <a:fontRef idx="minor">
               <a:schemeClr val="tx1"/>
-            </a:solidFill>
-          </a:ln>
-        </p:spPr>
-        <p:style>
-          <a:lnRef idx="2">
-            <a:schemeClr val="accent1"/>
-          </a:lnRef>
-          <a:fillRef idx="0">
-            <a:schemeClr val="accent1"/>
-          </a:fillRef>
-          <a:effectRef idx="1">
-            <a:schemeClr val="accent1"/>
-          </a:effectRef>
-          <a:fontRef idx="minor">
-            <a:schemeClr val="tx1"/>
-          </a:fontRef>
-        </p:style>
-      </p:cxnSp>
-      <p:cxnSp>
-        <p:nvCxnSpPr>
-          <p:cNvPr id="45" name="Gerader Verbinder 44">
-            <a:extLst>
-              <a:ext uri="{FF2B5EF4-FFF2-40B4-BE49-F238E27FC236}">
-                <a16:creationId xmlns:a16="http://schemas.microsoft.com/office/drawing/2014/main" id="{5B9B835A-1378-5DE3-6B7D-84F5EEF33CE4}"/>
-              </a:ext>
-            </a:extLst>
-          </p:cNvPr>
-          <p:cNvCxnSpPr>
-            <a:cxnSpLocks/>
-          </p:cNvCxnSpPr>
-          <p:nvPr/>
-        </p:nvCxnSpPr>
-        <p:spPr>
-          <a:xfrm flipV="1">
-            <a:off x="2124204" y="1810303"/>
-            <a:ext cx="337422" cy="2"/>
-          </a:xfrm>
-          <a:prstGeom prst="line">
-            <a:avLst/>
-          </a:prstGeom>
-          <a:ln w="101600">
-            <a:solidFill>
+            </a:fontRef>
+          </p:style>
+        </p:cxnSp>
+        <p:cxnSp>
+          <p:nvCxnSpPr>
+            <p:cNvPr id="45" name="Gerader Verbinder 44">
+              <a:extLst>
+                <a:ext uri="{FF2B5EF4-FFF2-40B4-BE49-F238E27FC236}">
+                  <a16:creationId xmlns:a16="http://schemas.microsoft.com/office/drawing/2014/main" id="{5B9B835A-1378-5DE3-6B7D-84F5EEF33CE4}"/>
+                </a:ext>
+              </a:extLst>
+            </p:cNvPr>
+            <p:cNvCxnSpPr>
+              <a:cxnSpLocks/>
+            </p:cNvCxnSpPr>
+            <p:nvPr/>
+          </p:nvCxnSpPr>
+          <p:spPr>
+            <a:xfrm flipV="1">
+              <a:off x="2124204" y="1810303"/>
+              <a:ext cx="337422" cy="2"/>
+            </a:xfrm>
+            <a:prstGeom prst="line">
+              <a:avLst/>
+            </a:prstGeom>
+            <a:ln w="101600">
+              <a:solidFill>
+                <a:schemeClr val="tx1"/>
+              </a:solidFill>
+            </a:ln>
+          </p:spPr>
+          <p:style>
+            <a:lnRef idx="2">
+              <a:schemeClr val="accent1"/>
+            </a:lnRef>
+            <a:fillRef idx="0">
+              <a:schemeClr val="accent1"/>
+            </a:fillRef>
+            <a:effectRef idx="1">
+              <a:schemeClr val="accent1"/>
+            </a:effectRef>
+            <a:fontRef idx="minor">
               <a:schemeClr val="tx1"/>
-            </a:solidFill>
-          </a:ln>
-        </p:spPr>
-        <p:style>
-          <a:lnRef idx="2">
-            <a:schemeClr val="accent1"/>
-          </a:lnRef>
-          <a:fillRef idx="0">
-            <a:schemeClr val="accent1"/>
-          </a:fillRef>
-          <a:effectRef idx="1">
-            <a:schemeClr val="accent1"/>
-          </a:effectRef>
-          <a:fontRef idx="minor">
-            <a:schemeClr val="tx1"/>
-          </a:fontRef>
-        </p:style>
-      </p:cxnSp>
+            </a:fontRef>
+          </p:style>
+        </p:cxnSp>
+      </p:grpSp>
     </p:spTree>
     <p:extLst>
       <p:ext uri="{BB962C8B-B14F-4D97-AF65-F5344CB8AC3E}">

</xml_diff>